<commit_message>
made some minor change
</commit_message>
<xml_diff>
--- a/Lecture.pptx
+++ b/Lecture.pptx
@@ -314,7 +314,7 @@
             <a:fld id="{87DE6118-2437-4B30-8E3C-4D2BE6020583}" type="datetimeFigureOut">
               <a:rPr lang="en-US" smtClean="0"/>
               <a:pPr/>
-              <a:t>9/22/16</a:t>
+              <a:t>9/24/16</a:t>
             </a:fld>
             <a:endParaRPr lang="en-US" dirty="0"/>
           </a:p>
@@ -659,7 +659,7 @@
             <a:fld id="{87DE6118-2437-4B30-8E3C-4D2BE6020583}" type="datetimeFigureOut">
               <a:rPr lang="en-US" smtClean="0"/>
               <a:pPr/>
-              <a:t>9/22/16</a:t>
+              <a:t>9/24/16</a:t>
             </a:fld>
             <a:endParaRPr lang="en-US" dirty="0"/>
           </a:p>
@@ -1062,7 +1062,7 @@
             <a:fld id="{87DE6118-2437-4B30-8E3C-4D2BE6020583}" type="datetimeFigureOut">
               <a:rPr lang="en-US" smtClean="0"/>
               <a:pPr/>
-              <a:t>9/22/16</a:t>
+              <a:t>9/24/16</a:t>
             </a:fld>
             <a:endParaRPr lang="en-US" dirty="0"/>
           </a:p>
@@ -1399,7 +1399,7 @@
             <a:fld id="{87DE6118-2437-4B30-8E3C-4D2BE6020583}" type="datetimeFigureOut">
               <a:rPr lang="en-US" smtClean="0"/>
               <a:pPr/>
-              <a:t>9/22/16</a:t>
+              <a:t>9/24/16</a:t>
             </a:fld>
             <a:endParaRPr lang="en-US" dirty="0"/>
           </a:p>
@@ -1721,7 +1721,7 @@
             <a:fld id="{87DE6118-2437-4B30-8E3C-4D2BE6020583}" type="datetimeFigureOut">
               <a:rPr lang="en-US" smtClean="0"/>
               <a:pPr/>
-              <a:t>9/22/16</a:t>
+              <a:t>9/24/16</a:t>
             </a:fld>
             <a:endParaRPr lang="en-US" dirty="0"/>
           </a:p>
@@ -2119,7 +2119,7 @@
             <a:fld id="{87DE6118-2437-4B30-8E3C-4D2BE6020583}" type="datetimeFigureOut">
               <a:rPr lang="en-US" smtClean="0"/>
               <a:pPr/>
-              <a:t>9/22/16</a:t>
+              <a:t>9/24/16</a:t>
             </a:fld>
             <a:endParaRPr lang="en-US" dirty="0"/>
           </a:p>
@@ -2377,7 +2377,7 @@
           <a:p>
             <a:fld id="{87DE6118-2437-4B30-8E3C-4D2BE6020583}" type="datetimeFigureOut">
               <a:rPr lang="en-US" smtClean="0"/>
-              <a:t>9/22/16</a:t>
+              <a:t>9/24/16</a:t>
             </a:fld>
             <a:endParaRPr lang="en-US" dirty="0"/>
           </a:p>
@@ -2639,7 +2639,7 @@
           <a:p>
             <a:fld id="{87DE6118-2437-4B30-8E3C-4D2BE6020583}" type="datetimeFigureOut">
               <a:rPr lang="en-US" smtClean="0"/>
-              <a:t>9/22/16</a:t>
+              <a:t>9/24/16</a:t>
             </a:fld>
             <a:endParaRPr lang="en-US" dirty="0"/>
           </a:p>
@@ -2901,7 +2901,7 @@
           <a:p>
             <a:fld id="{87DE6118-2437-4B30-8E3C-4D2BE6020583}" type="datetimeFigureOut">
               <a:rPr lang="en-US" smtClean="0"/>
-              <a:t>9/22/16</a:t>
+              <a:t>9/24/16</a:t>
             </a:fld>
             <a:endParaRPr lang="en-US" dirty="0"/>
           </a:p>
@@ -3231,7 +3231,7 @@
             <a:fld id="{87DE6118-2437-4B30-8E3C-4D2BE6020583}" type="datetimeFigureOut">
               <a:rPr lang="en-US" smtClean="0"/>
               <a:pPr/>
-              <a:t>9/22/16</a:t>
+              <a:t>9/24/16</a:t>
             </a:fld>
             <a:endParaRPr lang="en-US" dirty="0"/>
           </a:p>
@@ -3555,7 +3555,7 @@
           <a:p>
             <a:fld id="{87DE6118-2437-4B30-8E3C-4D2BE6020583}" type="datetimeFigureOut">
               <a:rPr lang="en-US" smtClean="0"/>
-              <a:t>9/22/16</a:t>
+              <a:t>9/24/16</a:t>
             </a:fld>
             <a:endParaRPr lang="en-US" dirty="0"/>
           </a:p>
@@ -4017,7 +4017,7 @@
           <a:p>
             <a:fld id="{87DE6118-2437-4B30-8E3C-4D2BE6020583}" type="datetimeFigureOut">
               <a:rPr lang="en-US" smtClean="0"/>
-              <a:t>9/22/16</a:t>
+              <a:t>9/24/16</a:t>
             </a:fld>
             <a:endParaRPr lang="en-US" dirty="0"/>
           </a:p>
@@ -4227,7 +4227,7 @@
           <a:p>
             <a:fld id="{87DE6118-2437-4B30-8E3C-4D2BE6020583}" type="datetimeFigureOut">
               <a:rPr lang="en-US" smtClean="0"/>
-              <a:t>9/22/16</a:t>
+              <a:t>9/24/16</a:t>
             </a:fld>
             <a:endParaRPr lang="en-US" dirty="0"/>
           </a:p>
@@ -4404,7 +4404,7 @@
           <a:p>
             <a:fld id="{87DE6118-2437-4B30-8E3C-4D2BE6020583}" type="datetimeFigureOut">
               <a:rPr lang="en-US" smtClean="0"/>
-              <a:t>9/22/16</a:t>
+              <a:t>9/24/16</a:t>
             </a:fld>
             <a:endParaRPr lang="en-US" dirty="0"/>
           </a:p>
@@ -4743,7 +4743,7 @@
             <a:fld id="{87DE6118-2437-4B30-8E3C-4D2BE6020583}" type="datetimeFigureOut">
               <a:rPr lang="en-US" smtClean="0"/>
               <a:pPr/>
-              <a:t>9/22/16</a:t>
+              <a:t>9/24/16</a:t>
             </a:fld>
             <a:endParaRPr lang="en-US" dirty="0"/>
           </a:p>
@@ -5095,7 +5095,7 @@
             <a:fld id="{87DE6118-2437-4B30-8E3C-4D2BE6020583}" type="datetimeFigureOut">
               <a:rPr lang="en-US" smtClean="0"/>
               <a:pPr/>
-              <a:t>9/22/16</a:t>
+              <a:t>9/24/16</a:t>
             </a:fld>
             <a:endParaRPr lang="en-US" dirty="0"/>
           </a:p>
@@ -7214,7 +7214,7 @@
             <a:fld id="{87DE6118-2437-4B30-8E3C-4D2BE6020583}" type="datetimeFigureOut">
               <a:rPr lang="en-US" smtClean="0"/>
               <a:pPr/>
-              <a:t>9/22/16</a:t>
+              <a:t>9/24/16</a:t>
             </a:fld>
             <a:endParaRPr lang="en-US" dirty="0"/>
           </a:p>
@@ -12360,7 +12360,15 @@
           <a:p>
             <a:r>
               <a:rPr lang="en-US" dirty="0" smtClean="0"/>
-              <a:t>% Modulus:  11 % 3 = 1  </a:t>
+              <a:t>% Modulus:  11 % 3 </a:t>
+            </a:r>
+            <a:r>
+              <a:rPr lang="en-US" smtClean="0"/>
+              <a:t>= </a:t>
+            </a:r>
+            <a:r>
+              <a:rPr lang="en-US" smtClean="0"/>
+              <a:t>2  </a:t>
             </a:r>
             <a:r>
               <a:rPr lang="en-US" dirty="0" smtClean="0">
@@ -14254,7 +14262,7 @@
           <a:p>
             <a:r>
               <a:rPr lang="en-US" dirty="0" smtClean="0"/>
-              <a:t>Code</a:t>
+              <a:t>Built-in Function</a:t>
             </a:r>
             <a:endParaRPr lang="en-US" dirty="0"/>
           </a:p>
@@ -14282,46 +14290,39 @@
           </a:bodyPr>
           <a:lstStyle/>
           <a:p>
+            <a:pPr marL="342900" lvl="1" indent="-342900"/>
             <a:r>
               <a:rPr lang="en-US" dirty="0" smtClean="0"/>
-              <a:t>Built-in Function</a:t>
-            </a:r>
-          </a:p>
-          <a:p>
-            <a:pPr marL="742950" lvl="2" indent="-342900"/>
+              <a:t>p</a:t>
+            </a:r>
+            <a:r>
+              <a:rPr lang="is-IS" dirty="0" smtClean="0"/>
+              <a:t>rint(...)  </a:t>
+            </a:r>
+            <a:endParaRPr lang="en-US" dirty="0" smtClean="0"/>
+          </a:p>
+          <a:p>
+            <a:r>
+              <a:rPr lang="en-US" dirty="0"/>
+              <a:t>m</a:t>
+            </a:r>
+            <a:r>
+              <a:rPr lang="en-US" dirty="0" smtClean="0"/>
+              <a:t>ax(</a:t>
+            </a:r>
+            <a:r>
+              <a:rPr lang="is-IS" dirty="0"/>
+              <a:t>…), min</a:t>
+            </a:r>
+            <a:r>
+              <a:rPr lang="is-IS" dirty="0" smtClean="0"/>
+              <a:t>(....), </a:t>
+            </a:r>
             <a:r>
               <a:rPr lang="en-US" dirty="0"/>
               <a:t>p</a:t>
             </a:r>
             <a:r>
-              <a:rPr lang="is-IS" dirty="0" smtClean="0"/>
-              <a:t>rint(...)  </a:t>
-            </a:r>
-            <a:endParaRPr lang="en-US" dirty="0" smtClean="0"/>
-          </a:p>
-          <a:p>
-            <a:pPr lvl="1"/>
-            <a:r>
-              <a:rPr lang="en-US" dirty="0"/>
-              <a:t>m</a:t>
-            </a:r>
-            <a:r>
-              <a:rPr lang="en-US" dirty="0" smtClean="0"/>
-              <a:t>ax(</a:t>
-            </a:r>
-            <a:r>
-              <a:rPr lang="is-IS" dirty="0"/>
-              <a:t>…), min</a:t>
-            </a:r>
-            <a:r>
-              <a:rPr lang="is-IS" dirty="0" smtClean="0"/>
-              <a:t>(....), </a:t>
-            </a:r>
-            <a:r>
-              <a:rPr lang="en-US" dirty="0"/>
-              <a:t>p</a:t>
-            </a:r>
-            <a:r>
               <a:rPr lang="is-IS" dirty="0"/>
               <a:t>ow</a:t>
             </a:r>
@@ -14343,14 +14344,13 @@
             </a:r>
           </a:p>
           <a:p>
-            <a:pPr lvl="1"/>
             <a:r>
               <a:rPr lang="en-US" dirty="0" smtClean="0"/>
               <a:t>round(..)</a:t>
             </a:r>
           </a:p>
           <a:p>
-            <a:pPr lvl="2"/>
+            <a:pPr lvl="1"/>
             <a:r>
               <a:rPr lang="en-US" dirty="0"/>
               <a:t>r</a:t>
@@ -14361,7 +14361,7 @@
             </a:r>
           </a:p>
           <a:p>
-            <a:pPr lvl="2"/>
+            <a:pPr lvl="1"/>
             <a:r>
               <a:rPr lang="en-US" dirty="0"/>
               <a:t>r</a:t>
@@ -14372,7 +14372,7 @@
             </a:r>
           </a:p>
           <a:p>
-            <a:pPr lvl="2"/>
+            <a:pPr lvl="1"/>
             <a:r>
               <a:rPr lang="en-US" dirty="0"/>
               <a:t>r</a:t>
@@ -14383,7 +14383,7 @@
             </a:r>
           </a:p>
           <a:p>
-            <a:pPr lvl="2"/>
+            <a:pPr lvl="1"/>
             <a:r>
               <a:rPr lang="en-US" dirty="0"/>
               <a:t>r</a:t>
@@ -14394,21 +14394,21 @@
             </a:r>
           </a:p>
           <a:p>
-            <a:pPr lvl="2"/>
+            <a:pPr lvl="1"/>
             <a:r>
               <a:rPr lang="en-US" dirty="0" smtClean="0"/>
               <a:t>Only round up when single digit (the digit before dot) is  an odd number</a:t>
             </a:r>
           </a:p>
           <a:p>
-            <a:pPr lvl="2"/>
+            <a:pPr lvl="1"/>
             <a:r>
               <a:rPr lang="en-US" dirty="0" smtClean="0"/>
               <a:t>round(233.333333, 2) = 233.33</a:t>
             </a:r>
           </a:p>
           <a:p>
-            <a:pPr lvl="2"/>
+            <a:pPr lvl="1"/>
             <a:r>
               <a:rPr lang="en-US" dirty="0"/>
               <a:t>r</a:t>
@@ -14427,7 +14427,7 @@
             </a:r>
           </a:p>
           <a:p>
-            <a:pPr lvl="2"/>
+            <a:pPr lvl="1"/>
             <a:r>
               <a:rPr lang="en-US" dirty="0"/>
               <a:t>round(233.3333, -2 ) = </a:t>
@@ -14446,7 +14446,6 @@
             </a:r>
           </a:p>
           <a:p>
-            <a:pPr lvl="1"/>
             <a:r>
               <a:rPr lang="en-US" dirty="0" err="1" smtClean="0"/>
               <a:t>str</a:t>
@@ -14461,7 +14460,6 @@
             </a:r>
           </a:p>
           <a:p>
-            <a:pPr lvl="1"/>
             <a:r>
               <a:rPr lang="en-US" dirty="0"/>
               <a:t>s</a:t>
@@ -14508,6 +14506,9 @@
                     <p:cTn id="3" fill="hold">
                       <p:stCondLst>
                         <p:cond delay="indefinite"/>
+                        <p:cond evt="onBegin" delay="0">
+                          <p:tn val="2"/>
+                        </p:cond>
                       </p:stCondLst>
                       <p:childTnLst>
                         <p:par>
@@ -14517,7 +14518,7 @@
                             </p:stCondLst>
                             <p:childTnLst>
                               <p:par>
-                                <p:cTn id="5" presetID="12" presetClass="entr" presetSubtype="4" fill="hold" nodeType="clickEffect">
+                                <p:cTn id="5" presetID="12" presetClass="entr" presetSubtype="4" fill="hold" nodeType="withEffect">
                                   <p:stCondLst>
                                     <p:cond delay="0"/>
                                   </p:stCondLst>
@@ -14656,15 +14657,33 @@
                                   </p:childTnLst>
                                 </p:cTn>
                               </p:par>
+                            </p:childTnLst>
+                          </p:cTn>
+                        </p:par>
+                      </p:childTnLst>
+                    </p:cTn>
+                  </p:par>
+                  <p:par>
+                    <p:cTn id="13" fill="hold">
+                      <p:stCondLst>
+                        <p:cond delay="indefinite"/>
+                      </p:stCondLst>
+                      <p:childTnLst>
+                        <p:par>
+                          <p:cTn id="14" fill="hold">
+                            <p:stCondLst>
+                              <p:cond delay="0"/>
+                            </p:stCondLst>
+                            <p:childTnLst>
                               <p:par>
-                                <p:cTn id="13" presetID="12" presetClass="entr" presetSubtype="4" fill="hold" nodeType="withEffect">
+                                <p:cTn id="15" presetID="14" presetClass="entr" presetSubtype="10" fill="hold" nodeType="clickEffect">
                                   <p:stCondLst>
                                     <p:cond delay="0"/>
                                   </p:stCondLst>
                                   <p:childTnLst>
                                     <p:set>
                                       <p:cBhvr>
-                                        <p:cTn id="14" dur="1" fill="hold">
+                                        <p:cTn id="16" dur="1" fill="hold">
                                           <p:stCondLst>
                                             <p:cond delay="0"/>
                                           </p:stCondLst>
@@ -14684,9 +14703,9 @@
                                         <p:strVal val="visible"/>
                                       </p:to>
                                     </p:set>
-                                    <p:anim calcmode="lin" valueType="num">
-                                      <p:cBhvr additive="base">
-                                        <p:cTn id="15" dur="500"/>
+                                    <p:animEffect transition="in" filter="randombar(horizontal)">
+                                      <p:cBhvr>
+                                        <p:cTn id="17" dur="500"/>
                                         <p:tgtEl>
                                           <p:spTgt spid="3">
                                             <p:txEl>
@@ -14694,30 +14713,46 @@
                                             </p:txEl>
                                           </p:spTgt>
                                         </p:tgtEl>
+                                      </p:cBhvr>
+                                    </p:animEffect>
+                                  </p:childTnLst>
+                                </p:cTn>
+                              </p:par>
+                              <p:par>
+                                <p:cTn id="18" presetID="14" presetClass="entr" presetSubtype="10" fill="hold" nodeType="withEffect">
+                                  <p:stCondLst>
+                                    <p:cond delay="0"/>
+                                  </p:stCondLst>
+                                  <p:childTnLst>
+                                    <p:set>
+                                      <p:cBhvr>
+                                        <p:cTn id="19" dur="1" fill="hold">
+                                          <p:stCondLst>
+                                            <p:cond delay="0"/>
+                                          </p:stCondLst>
+                                        </p:cTn>
+                                        <p:tgtEl>
+                                          <p:spTgt spid="3">
+                                            <p:txEl>
+                                              <p:pRg st="3" end="3"/>
+                                            </p:txEl>
+                                          </p:spTgt>
+                                        </p:tgtEl>
                                         <p:attrNameLst>
-                                          <p:attrName>ppt_y</p:attrName>
+                                          <p:attrName>style.visibility</p:attrName>
                                         </p:attrNameLst>
                                       </p:cBhvr>
-                                      <p:tavLst>
-                                        <p:tav tm="0">
-                                          <p:val>
-                                            <p:strVal val="#ppt_y+#ppt_h*1.125000"/>
-                                          </p:val>
-                                        </p:tav>
-                                        <p:tav tm="100000">
-                                          <p:val>
-                                            <p:strVal val="#ppt_y"/>
-                                          </p:val>
-                                        </p:tav>
-                                      </p:tavLst>
-                                    </p:anim>
-                                    <p:animEffect transition="in" filter="wipe(up)">
+                                      <p:to>
+                                        <p:strVal val="visible"/>
+                                      </p:to>
+                                    </p:set>
+                                    <p:animEffect transition="in" filter="randombar(horizontal)">
                                       <p:cBhvr>
-                                        <p:cTn id="16" dur="500"/>
-                                        <p:tgtEl>
-                                          <p:spTgt spid="3">
-                                            <p:txEl>
-                                              <p:pRg st="2" end="2"/>
+                                        <p:cTn id="20" dur="500"/>
+                                        <p:tgtEl>
+                                          <p:spTgt spid="3">
+                                            <p:txEl>
+                                              <p:pRg st="3" end="3"/>
                                             </p:txEl>
                                           </p:spTgt>
                                         </p:tgtEl>
@@ -14733,26 +14768,26 @@
                     </p:cTn>
                   </p:par>
                   <p:par>
-                    <p:cTn id="17" fill="hold">
+                    <p:cTn id="21" fill="hold">
                       <p:stCondLst>
                         <p:cond delay="indefinite"/>
                       </p:stCondLst>
                       <p:childTnLst>
                         <p:par>
-                          <p:cTn id="18" fill="hold">
+                          <p:cTn id="22" fill="hold">
                             <p:stCondLst>
                               <p:cond delay="0"/>
                             </p:stCondLst>
                             <p:childTnLst>
                               <p:par>
-                                <p:cTn id="19" presetID="14" presetClass="entr" presetSubtype="10" fill="hold" nodeType="clickEffect">
+                                <p:cTn id="23" presetID="6" presetClass="entr" presetSubtype="16" fill="hold" nodeType="clickEffect">
                                   <p:stCondLst>
                                     <p:cond delay="0"/>
                                   </p:stCondLst>
                                   <p:childTnLst>
                                     <p:set>
                                       <p:cBhvr>
-                                        <p:cTn id="20" dur="1" fill="hold">
+                                        <p:cTn id="24" dur="1" fill="hold">
                                           <p:stCondLst>
                                             <p:cond delay="0"/>
                                           </p:stCondLst>
@@ -14760,7 +14795,7 @@
                                         <p:tgtEl>
                                           <p:spTgt spid="3">
                                             <p:txEl>
-                                              <p:pRg st="3" end="3"/>
+                                              <p:pRg st="4" end="4"/>
                                             </p:txEl>
                                           </p:spTgt>
                                         </p:tgtEl>
@@ -14772,52 +14807,9 @@
                                         <p:strVal val="visible"/>
                                       </p:to>
                                     </p:set>
-                                    <p:animEffect transition="in" filter="randombar(horizontal)">
+                                    <p:animEffect transition="in" filter="circle(in)">
                                       <p:cBhvr>
-                                        <p:cTn id="21" dur="500"/>
-                                        <p:tgtEl>
-                                          <p:spTgt spid="3">
-                                            <p:txEl>
-                                              <p:pRg st="3" end="3"/>
-                                            </p:txEl>
-                                          </p:spTgt>
-                                        </p:tgtEl>
-                                      </p:cBhvr>
-                                    </p:animEffect>
-                                  </p:childTnLst>
-                                </p:cTn>
-                              </p:par>
-                              <p:par>
-                                <p:cTn id="22" presetID="14" presetClass="entr" presetSubtype="10" fill="hold" nodeType="withEffect">
-                                  <p:stCondLst>
-                                    <p:cond delay="0"/>
-                                  </p:stCondLst>
-                                  <p:childTnLst>
-                                    <p:set>
-                                      <p:cBhvr>
-                                        <p:cTn id="23" dur="1" fill="hold">
-                                          <p:stCondLst>
-                                            <p:cond delay="0"/>
-                                          </p:stCondLst>
-                                        </p:cTn>
-                                        <p:tgtEl>
-                                          <p:spTgt spid="3">
-                                            <p:txEl>
-                                              <p:pRg st="4" end="4"/>
-                                            </p:txEl>
-                                          </p:spTgt>
-                                        </p:tgtEl>
-                                        <p:attrNameLst>
-                                          <p:attrName>style.visibility</p:attrName>
-                                        </p:attrNameLst>
-                                      </p:cBhvr>
-                                      <p:to>
-                                        <p:strVal val="visible"/>
-                                      </p:to>
-                                    </p:set>
-                                    <p:animEffect transition="in" filter="randombar(horizontal)">
-                                      <p:cBhvr>
-                                        <p:cTn id="24" dur="500"/>
+                                        <p:cTn id="25" dur="2000"/>
                                         <p:tgtEl>
                                           <p:spTgt spid="3">
                                             <p:txEl>
@@ -14837,26 +14829,26 @@
                     </p:cTn>
                   </p:par>
                   <p:par>
-                    <p:cTn id="25" fill="hold">
+                    <p:cTn id="26" fill="hold">
                       <p:stCondLst>
                         <p:cond delay="indefinite"/>
                       </p:stCondLst>
                       <p:childTnLst>
                         <p:par>
-                          <p:cTn id="26" fill="hold">
+                          <p:cTn id="27" fill="hold">
                             <p:stCondLst>
                               <p:cond delay="0"/>
                             </p:stCondLst>
                             <p:childTnLst>
                               <p:par>
-                                <p:cTn id="27" presetID="6" presetClass="entr" presetSubtype="16" fill="hold" nodeType="clickEffect">
+                                <p:cTn id="28" presetID="14" presetClass="entr" presetSubtype="10" fill="hold" nodeType="clickEffect">
                                   <p:stCondLst>
                                     <p:cond delay="0"/>
                                   </p:stCondLst>
                                   <p:childTnLst>
                                     <p:set>
                                       <p:cBhvr>
-                                        <p:cTn id="28" dur="1" fill="hold">
+                                        <p:cTn id="29" dur="1" fill="hold">
                                           <p:stCondLst>
                                             <p:cond delay="0"/>
                                           </p:stCondLst>
@@ -14876,9 +14868,9 @@
                                         <p:strVal val="visible"/>
                                       </p:to>
                                     </p:set>
-                                    <p:animEffect transition="in" filter="circle(in)">
+                                    <p:animEffect transition="in" filter="randombar(horizontal)">
                                       <p:cBhvr>
-                                        <p:cTn id="29" dur="2000"/>
+                                        <p:cTn id="30" dur="500"/>
                                         <p:tgtEl>
                                           <p:spTgt spid="3">
                                             <p:txEl>
@@ -14898,26 +14890,26 @@
                     </p:cTn>
                   </p:par>
                   <p:par>
-                    <p:cTn id="30" fill="hold">
+                    <p:cTn id="31" fill="hold">
                       <p:stCondLst>
                         <p:cond delay="indefinite"/>
                       </p:stCondLst>
                       <p:childTnLst>
                         <p:par>
-                          <p:cTn id="31" fill="hold">
+                          <p:cTn id="32" fill="hold">
                             <p:stCondLst>
                               <p:cond delay="0"/>
                             </p:stCondLst>
                             <p:childTnLst>
                               <p:par>
-                                <p:cTn id="32" presetID="14" presetClass="entr" presetSubtype="10" fill="hold" nodeType="clickEffect">
+                                <p:cTn id="33" presetID="14" presetClass="entr" presetSubtype="10" fill="hold" nodeType="clickEffect">
                                   <p:stCondLst>
                                     <p:cond delay="0"/>
                                   </p:stCondLst>
                                   <p:childTnLst>
                                     <p:set>
                                       <p:cBhvr>
-                                        <p:cTn id="33" dur="1" fill="hold">
+                                        <p:cTn id="34" dur="1" fill="hold">
                                           <p:stCondLst>
                                             <p:cond delay="0"/>
                                           </p:stCondLst>
@@ -14939,11 +14931,54 @@
                                     </p:set>
                                     <p:animEffect transition="in" filter="randombar(horizontal)">
                                       <p:cBhvr>
-                                        <p:cTn id="34" dur="500"/>
+                                        <p:cTn id="35" dur="500"/>
                                         <p:tgtEl>
                                           <p:spTgt spid="3">
                                             <p:txEl>
                                               <p:pRg st="6" end="6"/>
+                                            </p:txEl>
+                                          </p:spTgt>
+                                        </p:tgtEl>
+                                      </p:cBhvr>
+                                    </p:animEffect>
+                                  </p:childTnLst>
+                                </p:cTn>
+                              </p:par>
+                              <p:par>
+                                <p:cTn id="36" presetID="14" presetClass="entr" presetSubtype="10" fill="hold" nodeType="withEffect">
+                                  <p:stCondLst>
+                                    <p:cond delay="0"/>
+                                  </p:stCondLst>
+                                  <p:childTnLst>
+                                    <p:set>
+                                      <p:cBhvr>
+                                        <p:cTn id="37" dur="1" fill="hold">
+                                          <p:stCondLst>
+                                            <p:cond delay="0"/>
+                                          </p:stCondLst>
+                                        </p:cTn>
+                                        <p:tgtEl>
+                                          <p:spTgt spid="3">
+                                            <p:txEl>
+                                              <p:pRg st="7" end="7"/>
+                                            </p:txEl>
+                                          </p:spTgt>
+                                        </p:tgtEl>
+                                        <p:attrNameLst>
+                                          <p:attrName>style.visibility</p:attrName>
+                                        </p:attrNameLst>
+                                      </p:cBhvr>
+                                      <p:to>
+                                        <p:strVal val="visible"/>
+                                      </p:to>
+                                    </p:set>
+                                    <p:animEffect transition="in" filter="randombar(horizontal)">
+                                      <p:cBhvr>
+                                        <p:cTn id="38" dur="500"/>
+                                        <p:tgtEl>
+                                          <p:spTgt spid="3">
+                                            <p:txEl>
+                                              <p:pRg st="7" end="7"/>
                                             </p:txEl>
                                           </p:spTgt>
                                         </p:tgtEl>
@@ -14959,26 +14994,26 @@
                     </p:cTn>
                   </p:par>
                   <p:par>
-                    <p:cTn id="35" fill="hold">
+                    <p:cTn id="39" fill="hold">
                       <p:stCondLst>
                         <p:cond delay="indefinite"/>
                       </p:stCondLst>
                       <p:childTnLst>
                         <p:par>
-                          <p:cTn id="36" fill="hold">
+                          <p:cTn id="40" fill="hold">
                             <p:stCondLst>
                               <p:cond delay="0"/>
                             </p:stCondLst>
                             <p:childTnLst>
                               <p:par>
-                                <p:cTn id="37" presetID="14" presetClass="entr" presetSubtype="10" fill="hold" nodeType="clickEffect">
+                                <p:cTn id="41" presetID="14" presetClass="entr" presetSubtype="10" fill="hold" nodeType="clickEffect">
                                   <p:stCondLst>
                                     <p:cond delay="0"/>
                                   </p:stCondLst>
                                   <p:childTnLst>
                                     <p:set>
                                       <p:cBhvr>
-                                        <p:cTn id="38" dur="1" fill="hold">
+                                        <p:cTn id="42" dur="1" fill="hold">
                                           <p:stCondLst>
                                             <p:cond delay="0"/>
                                           </p:stCondLst>
@@ -14986,7 +15021,7 @@
                                         <p:tgtEl>
                                           <p:spTgt spid="3">
                                             <p:txEl>
-                                              <p:pRg st="7" end="7"/>
+                                              <p:pRg st="8" end="8"/>
                                             </p:txEl>
                                           </p:spTgt>
                                         </p:tgtEl>
@@ -15000,50 +15035,7 @@
                                     </p:set>
                                     <p:animEffect transition="in" filter="randombar(horizontal)">
                                       <p:cBhvr>
-                                        <p:cTn id="39" dur="500"/>
-                                        <p:tgtEl>
-                                          <p:spTgt spid="3">
-                                            <p:txEl>
-                                              <p:pRg st="7" end="7"/>
-                                            </p:txEl>
-                                          </p:spTgt>
-                                        </p:tgtEl>
-                                      </p:cBhvr>
-                                    </p:animEffect>
-                                  </p:childTnLst>
-                                </p:cTn>
-                              </p:par>
-                              <p:par>
-                                <p:cTn id="40" presetID="14" presetClass="entr" presetSubtype="10" fill="hold" nodeType="withEffect">
-                                  <p:stCondLst>
-                                    <p:cond delay="0"/>
-                                  </p:stCondLst>
-                                  <p:childTnLst>
-                                    <p:set>
-                                      <p:cBhvr>
-                                        <p:cTn id="41" dur="1" fill="hold">
-                                          <p:stCondLst>
-                                            <p:cond delay="0"/>
-                                          </p:stCondLst>
-                                        </p:cTn>
-                                        <p:tgtEl>
-                                          <p:spTgt spid="3">
-                                            <p:txEl>
-                                              <p:pRg st="8" end="8"/>
-                                            </p:txEl>
-                                          </p:spTgt>
-                                        </p:tgtEl>
-                                        <p:attrNameLst>
-                                          <p:attrName>style.visibility</p:attrName>
-                                        </p:attrNameLst>
-                                      </p:cBhvr>
-                                      <p:to>
-                                        <p:strVal val="visible"/>
-                                      </p:to>
-                                    </p:set>
-                                    <p:animEffect transition="in" filter="randombar(horizontal)">
-                                      <p:cBhvr>
-                                        <p:cTn id="42" dur="500"/>
+                                        <p:cTn id="43" dur="500"/>
                                         <p:tgtEl>
                                           <p:spTgt spid="3">
                                             <p:txEl>
@@ -15063,26 +15055,26 @@
                     </p:cTn>
                   </p:par>
                   <p:par>
-                    <p:cTn id="43" fill="hold">
+                    <p:cTn id="44" fill="hold">
                       <p:stCondLst>
                         <p:cond delay="indefinite"/>
                       </p:stCondLst>
                       <p:childTnLst>
                         <p:par>
-                          <p:cTn id="44" fill="hold">
+                          <p:cTn id="45" fill="hold">
                             <p:stCondLst>
                               <p:cond delay="0"/>
                             </p:stCondLst>
                             <p:childTnLst>
                               <p:par>
-                                <p:cTn id="45" presetID="14" presetClass="entr" presetSubtype="10" fill="hold" nodeType="clickEffect">
+                                <p:cTn id="46" presetID="14" presetClass="entr" presetSubtype="10" fill="hold" nodeType="clickEffect">
                                   <p:stCondLst>
                                     <p:cond delay="0"/>
                                   </p:stCondLst>
                                   <p:childTnLst>
                                     <p:set>
                                       <p:cBhvr>
-                                        <p:cTn id="46" dur="1" fill="hold">
+                                        <p:cTn id="47" dur="1" fill="hold">
                                           <p:stCondLst>
                                             <p:cond delay="0"/>
                                           </p:stCondLst>
@@ -15104,7 +15096,7 @@
                                     </p:set>
                                     <p:animEffect transition="in" filter="randombar(horizontal)">
                                       <p:cBhvr>
-                                        <p:cTn id="47" dur="500"/>
+                                        <p:cTn id="48" dur="500"/>
                                         <p:tgtEl>
                                           <p:spTgt spid="3">
                                             <p:txEl>
@@ -15124,26 +15116,26 @@
                     </p:cTn>
                   </p:par>
                   <p:par>
-                    <p:cTn id="48" fill="hold">
+                    <p:cTn id="49" fill="hold">
                       <p:stCondLst>
                         <p:cond delay="indefinite"/>
                       </p:stCondLst>
                       <p:childTnLst>
                         <p:par>
-                          <p:cTn id="49" fill="hold">
+                          <p:cTn id="50" fill="hold">
                             <p:stCondLst>
                               <p:cond delay="0"/>
                             </p:stCondLst>
                             <p:childTnLst>
                               <p:par>
-                                <p:cTn id="50" presetID="14" presetClass="entr" presetSubtype="10" fill="hold" nodeType="clickEffect">
+                                <p:cTn id="51" presetID="14" presetClass="entr" presetSubtype="10" fill="hold" nodeType="clickEffect">
                                   <p:stCondLst>
                                     <p:cond delay="0"/>
                                   </p:stCondLst>
                                   <p:childTnLst>
                                     <p:set>
                                       <p:cBhvr>
-                                        <p:cTn id="51" dur="1" fill="hold">
+                                        <p:cTn id="52" dur="1" fill="hold">
                                           <p:stCondLst>
                                             <p:cond delay="0"/>
                                           </p:stCondLst>
@@ -15165,7 +15157,7 @@
                                     </p:set>
                                     <p:animEffect transition="in" filter="randombar(horizontal)">
                                       <p:cBhvr>
-                                        <p:cTn id="52" dur="500"/>
+                                        <p:cTn id="53" dur="500"/>
                                         <p:tgtEl>
                                           <p:spTgt spid="3">
                                             <p:txEl>
@@ -15185,26 +15177,26 @@
                     </p:cTn>
                   </p:par>
                   <p:par>
-                    <p:cTn id="53" fill="hold">
+                    <p:cTn id="54" fill="hold">
                       <p:stCondLst>
                         <p:cond delay="indefinite"/>
                       </p:stCondLst>
                       <p:childTnLst>
                         <p:par>
-                          <p:cTn id="54" fill="hold">
+                          <p:cTn id="55" fill="hold">
                             <p:stCondLst>
                               <p:cond delay="0"/>
                             </p:stCondLst>
                             <p:childTnLst>
                               <p:par>
-                                <p:cTn id="55" presetID="14" presetClass="entr" presetSubtype="10" fill="hold" nodeType="clickEffect">
+                                <p:cTn id="56" presetID="14" presetClass="entr" presetSubtype="10" fill="hold" nodeType="clickEffect">
                                   <p:stCondLst>
                                     <p:cond delay="0"/>
                                   </p:stCondLst>
                                   <p:childTnLst>
                                     <p:set>
                                       <p:cBhvr>
-                                        <p:cTn id="56" dur="1" fill="hold">
+                                        <p:cTn id="57" dur="1" fill="hold">
                                           <p:stCondLst>
                                             <p:cond delay="0"/>
                                           </p:stCondLst>
@@ -15226,7 +15218,7 @@
                                     </p:set>
                                     <p:animEffect transition="in" filter="randombar(horizontal)">
                                       <p:cBhvr>
-                                        <p:cTn id="57" dur="500"/>
+                                        <p:cTn id="58" dur="500"/>
                                         <p:tgtEl>
                                           <p:spTgt spid="3">
                                             <p:txEl>
@@ -15239,33 +15231,15 @@
                                   </p:childTnLst>
                                 </p:cTn>
                               </p:par>
-                            </p:childTnLst>
-                          </p:cTn>
-                        </p:par>
-                      </p:childTnLst>
-                    </p:cTn>
-                  </p:par>
-                  <p:par>
-                    <p:cTn id="58" fill="hold">
-                      <p:stCondLst>
-                        <p:cond delay="indefinite"/>
-                      </p:stCondLst>
-                      <p:childTnLst>
-                        <p:par>
-                          <p:cTn id="59" fill="hold">
-                            <p:stCondLst>
-                              <p:cond delay="0"/>
-                            </p:stCondLst>
-                            <p:childTnLst>
                               <p:par>
-                                <p:cTn id="60" presetID="14" presetClass="entr" presetSubtype="10" fill="hold" nodeType="clickEffect">
+                                <p:cTn id="59" presetID="14" presetClass="entr" presetSubtype="10" fill="hold" nodeType="withEffect">
                                   <p:stCondLst>
                                     <p:cond delay="0"/>
                                   </p:stCondLst>
                                   <p:childTnLst>
                                     <p:set>
                                       <p:cBhvr>
-                                        <p:cTn id="61" dur="1" fill="hold">
+                                        <p:cTn id="60" dur="1" fill="hold">
                                           <p:stCondLst>
                                             <p:cond delay="0"/>
                                           </p:stCondLst>
@@ -15287,54 +15261,11 @@
                                     </p:set>
                                     <p:animEffect transition="in" filter="randombar(horizontal)">
                                       <p:cBhvr>
-                                        <p:cTn id="62" dur="500"/>
+                                        <p:cTn id="61" dur="500"/>
                                         <p:tgtEl>
                                           <p:spTgt spid="3">
                                             <p:txEl>
                                               <p:pRg st="12" end="12"/>
-                                            </p:txEl>
-                                          </p:spTgt>
-                                        </p:tgtEl>
-                                      </p:cBhvr>
-                                    </p:animEffect>
-                                  </p:childTnLst>
-                                </p:cTn>
-                              </p:par>
-                              <p:par>
-                                <p:cTn id="63" presetID="14" presetClass="entr" presetSubtype="10" fill="hold" nodeType="withEffect">
-                                  <p:stCondLst>
-                                    <p:cond delay="0"/>
-                                  </p:stCondLst>
-                                  <p:childTnLst>
-                                    <p:set>
-                                      <p:cBhvr>
-                                        <p:cTn id="64" dur="1" fill="hold">
-                                          <p:stCondLst>
-                                            <p:cond delay="0"/>
-                                          </p:stCondLst>
-                                        </p:cTn>
-                                        <p:tgtEl>
-                                          <p:spTgt spid="3">
-                                            <p:txEl>
-                                              <p:pRg st="13" end="13"/>
-                                            </p:txEl>
-                                          </p:spTgt>
-                                        </p:tgtEl>
-                                        <p:attrNameLst>
-                                          <p:attrName>style.visibility</p:attrName>
-                                        </p:attrNameLst>
-                                      </p:cBhvr>
-                                      <p:to>
-                                        <p:strVal val="visible"/>
-                                      </p:to>
-                                    </p:set>
-                                    <p:animEffect transition="in" filter="randombar(horizontal)">
-                                      <p:cBhvr>
-                                        <p:cTn id="65" dur="500"/>
-                                        <p:tgtEl>
-                                          <p:spTgt spid="3">
-                                            <p:txEl>
-                                              <p:pRg st="13" end="13"/>
                                             </p:txEl>
                                           </p:spTgt>
                                         </p:tgtEl>
@@ -15431,13 +15362,13 @@
         </p:nvSpPr>
         <p:spPr>
           <a:xfrm>
-            <a:off x="2463088" y="1443038"/>
+            <a:off x="2248775" y="1185863"/>
             <a:ext cx="8915400" cy="5054326"/>
           </a:xfrm>
         </p:spPr>
         <p:txBody>
           <a:bodyPr>
-            <a:normAutofit/>
+            <a:normAutofit fontScale="92500" lnSpcReduction="20000"/>
           </a:bodyPr>
           <a:lstStyle/>
           <a:p>
@@ -15472,23 +15403,33 @@
           <a:p>
             <a:r>
               <a:rPr lang="en-US" dirty="0" smtClean="0"/>
-              <a:t>Indentation</a:t>
-            </a:r>
-            <a:endParaRPr lang="is-IS" dirty="0" smtClean="0"/>
-          </a:p>
-          <a:p>
-            <a:r>
-              <a:rPr lang="is-IS" dirty="0" smtClean="0"/>
-              <a:t>Question:  </a:t>
-            </a:r>
-          </a:p>
-          <a:p>
-            <a:pPr marL="400050" lvl="1" indent="0">
+              <a:t>If – else:  examples</a:t>
+            </a:r>
+          </a:p>
+          <a:p>
+            <a:pPr marL="457200" lvl="1" indent="0">
               <a:buNone/>
             </a:pPr>
             <a:r>
+              <a:rPr lang="en-US" dirty="0" smtClean="0"/>
+              <a:t>1. If age &gt; 20:							4. if  age &gt; 20:</a:t>
+            </a:r>
+          </a:p>
+          <a:p>
+            <a:pPr marL="457200" lvl="1" indent="0">
+              <a:buNone/>
+            </a:pPr>
+            <a:r>
+              <a:rPr lang="en-US" dirty="0"/>
+              <a:t>	</a:t>
+            </a:r>
+            <a:r>
+              <a:rPr lang="en-US" dirty="0" smtClean="0"/>
+              <a:t>print(‘</a:t>
+            </a:r>
+            <a:r>
               <a:rPr lang="en-US" dirty="0" err="1" smtClean="0"/>
-              <a:t>def</a:t>
+              <a:t>lao</a:t>
             </a:r>
             <a:r>
               <a:rPr lang="en-US" dirty="0" smtClean="0"/>
@@ -15496,103 +15437,280 @@
             </a:r>
             <a:r>
               <a:rPr lang="en-US" dirty="0" err="1" smtClean="0"/>
-              <a:t>avg</a:t>
+              <a:t>si</a:t>
             </a:r>
             <a:r>
               <a:rPr lang="en-US" dirty="0" smtClean="0"/>
-              <a:t>(num1, num2):</a:t>
-            </a:r>
-          </a:p>
-          <a:p>
-            <a:pPr marL="400050" lvl="1" indent="0">
+              <a:t> </a:t>
+            </a:r>
+            <a:r>
+              <a:rPr lang="en-US" dirty="0" err="1" smtClean="0"/>
+              <a:t>ji</a:t>
+            </a:r>
+            <a:r>
+              <a:rPr lang="en-US" dirty="0" smtClean="0"/>
+              <a:t>’)							print(‘</a:t>
+            </a:r>
+            <a:r>
+              <a:rPr lang="en-US" dirty="0" err="1" smtClean="0"/>
+              <a:t>lao</a:t>
+            </a:r>
+            <a:r>
+              <a:rPr lang="en-US" dirty="0" smtClean="0"/>
+              <a:t> </a:t>
+            </a:r>
+            <a:r>
+              <a:rPr lang="en-US" dirty="0" err="1" smtClean="0"/>
+              <a:t>si</a:t>
+            </a:r>
+            <a:r>
+              <a:rPr lang="en-US" dirty="0" smtClean="0"/>
+              <a:t> </a:t>
+            </a:r>
+            <a:r>
+              <a:rPr lang="en-US" dirty="0" err="1" smtClean="0"/>
+              <a:t>ji</a:t>
+            </a:r>
+            <a:r>
+              <a:rPr lang="en-US" dirty="0" smtClean="0"/>
+              <a:t>’)</a:t>
+            </a:r>
+          </a:p>
+          <a:p>
+            <a:pPr marL="457200" lvl="1" indent="0">
               <a:buNone/>
             </a:pPr>
             <a:r>
               <a:rPr lang="en-US" dirty="0" smtClean="0"/>
-              <a:t>“””(</a:t>
-            </a:r>
-            <a:r>
-              <a:rPr lang="en-US" dirty="0" err="1" smtClean="0"/>
-              <a:t>int</a:t>
-            </a:r>
-            <a:r>
-              <a:rPr lang="en-US" dirty="0" smtClean="0"/>
-              <a:t>, </a:t>
-            </a:r>
-            <a:r>
-              <a:rPr lang="en-US" dirty="0" err="1" smtClean="0"/>
-              <a:t>int</a:t>
-            </a:r>
-            <a:r>
-              <a:rPr lang="en-US" dirty="0" smtClean="0"/>
-              <a:t>) -&gt; </a:t>
-            </a:r>
-            <a:r>
-              <a:rPr lang="en-US" dirty="0" err="1" smtClean="0"/>
-              <a:t>int</a:t>
-            </a:r>
-            <a:endParaRPr lang="en-US" dirty="0" smtClean="0"/>
-          </a:p>
-          <a:p>
-            <a:pPr marL="800100" lvl="2" indent="0">
+              <a:t>2. If age &lt; 5:							    if  income &lt; 30:</a:t>
+            </a:r>
+          </a:p>
+          <a:p>
+            <a:pPr marL="457200" lvl="1" indent="0">
               <a:buNone/>
             </a:pPr>
             <a:r>
+              <a:rPr lang="en-US" dirty="0"/>
+              <a:t>	</a:t>
+            </a:r>
+            <a:r>
               <a:rPr lang="en-US" dirty="0" smtClean="0"/>
-              <a:t>Return the average value of num1 and num2</a:t>
-            </a:r>
-          </a:p>
-          <a:p>
-            <a:pPr marL="800100" lvl="2" indent="0">
+              <a:t>print (‘</a:t>
+            </a:r>
+            <a:r>
+              <a:rPr lang="en-US" dirty="0" err="1" smtClean="0"/>
+              <a:t>lil</a:t>
+            </a:r>
+            <a:r>
+              <a:rPr lang="en-US" dirty="0" smtClean="0"/>
+              <a:t> </a:t>
+            </a:r>
+            <a:r>
+              <a:rPr lang="en-US" dirty="0" err="1" smtClean="0"/>
+              <a:t>boi</a:t>
+            </a:r>
+            <a:r>
+              <a:rPr lang="en-US" dirty="0" smtClean="0"/>
+              <a:t>’)							print(‘kai </a:t>
+            </a:r>
+            <a:r>
+              <a:rPr lang="en-US" dirty="0" err="1" smtClean="0"/>
+              <a:t>po</a:t>
+            </a:r>
+            <a:r>
+              <a:rPr lang="en-US" dirty="0" smtClean="0"/>
+              <a:t> </a:t>
+            </a:r>
+            <a:r>
+              <a:rPr lang="en-US" dirty="0" err="1" smtClean="0"/>
+              <a:t>che</a:t>
+            </a:r>
+            <a:r>
+              <a:rPr lang="en-US" dirty="0" smtClean="0"/>
+              <a:t>’)</a:t>
+            </a:r>
+          </a:p>
+          <a:p>
+            <a:pPr marL="457200" lvl="1" indent="0">
               <a:buNone/>
             </a:pPr>
             <a:r>
               <a:rPr lang="en-US" dirty="0" smtClean="0"/>
-              <a:t>&gt;&gt;&gt;</a:t>
-            </a:r>
-            <a:r>
-              <a:rPr lang="en-US" dirty="0" err="1" smtClean="0"/>
-              <a:t>avg</a:t>
-            </a:r>
-            <a:r>
-              <a:rPr lang="en-US" dirty="0" smtClean="0"/>
-              <a:t>(3,5)</a:t>
-            </a:r>
-          </a:p>
-          <a:p>
-            <a:pPr marL="800100" lvl="2" indent="0">
+              <a:t>     else:								     else:</a:t>
+            </a:r>
+          </a:p>
+          <a:p>
+            <a:pPr marL="457200" lvl="1" indent="0">
               <a:buNone/>
             </a:pPr>
             <a:r>
+              <a:rPr lang="en-US" dirty="0"/>
+              <a:t>	</a:t>
+            </a:r>
+            <a:r>
               <a:rPr lang="en-US" dirty="0" smtClean="0"/>
-              <a:t>4</a:t>
-            </a:r>
-          </a:p>
-          <a:p>
-            <a:pPr marL="400050" lvl="1" indent="0">
+              <a:t>print(‘</a:t>
+            </a:r>
+            <a:r>
+              <a:rPr lang="en-US" dirty="0" err="1" smtClean="0"/>
+              <a:t>lao</a:t>
+            </a:r>
+            <a:r>
+              <a:rPr lang="en-US" dirty="0" smtClean="0"/>
+              <a:t> </a:t>
+            </a:r>
+            <a:r>
+              <a:rPr lang="en-US" dirty="0" err="1" smtClean="0"/>
+              <a:t>si</a:t>
+            </a:r>
+            <a:r>
+              <a:rPr lang="en-US" dirty="0" smtClean="0"/>
+              <a:t> </a:t>
+            </a:r>
+            <a:r>
+              <a:rPr lang="en-US" dirty="0" err="1" smtClean="0"/>
+              <a:t>ji</a:t>
+            </a:r>
+            <a:r>
+              <a:rPr lang="en-US" dirty="0" smtClean="0"/>
+              <a:t>’)							print(‘kai </a:t>
+            </a:r>
+            <a:r>
+              <a:rPr lang="en-US" dirty="0" err="1" smtClean="0"/>
+              <a:t>hao</a:t>
+            </a:r>
+            <a:r>
+              <a:rPr lang="en-US" dirty="0" smtClean="0"/>
+              <a:t> </a:t>
+            </a:r>
+            <a:r>
+              <a:rPr lang="en-US" dirty="0" err="1" smtClean="0"/>
+              <a:t>che</a:t>
+            </a:r>
+            <a:r>
+              <a:rPr lang="en-US" dirty="0" smtClean="0"/>
+              <a:t>’)</a:t>
+            </a:r>
+          </a:p>
+          <a:p>
+            <a:pPr marL="457200" lvl="1" indent="0">
               <a:buNone/>
             </a:pPr>
             <a:r>
               <a:rPr lang="en-US" dirty="0" smtClean="0"/>
-              <a:t>	“””</a:t>
-            </a:r>
-          </a:p>
-          <a:p>
-            <a:r>
-              <a:rPr lang="is-IS" dirty="0" smtClean="0"/>
-              <a:t> Bool function </a:t>
+              <a:t>3. If age &lt; 5:</a:t>
+            </a:r>
+          </a:p>
+          <a:p>
+            <a:pPr marL="457200" lvl="1" indent="0">
+              <a:buNone/>
+            </a:pPr>
+            <a:r>
+              <a:rPr lang="en-US" dirty="0"/>
+              <a:t>	</a:t>
             </a:r>
             <a:r>
               <a:rPr lang="en-US" dirty="0" smtClean="0"/>
-              <a:t>(no-if required)</a:t>
-            </a:r>
-            <a:endParaRPr lang="is-IS" dirty="0" smtClean="0"/>
-          </a:p>
-          <a:p>
-            <a:r>
-              <a:rPr lang="is-IS" dirty="0" smtClean="0"/>
-              <a:t>Function-reuse</a:t>
-            </a:r>
+              <a:t>print(‘</a:t>
+            </a:r>
+            <a:r>
+              <a:rPr lang="en-US" dirty="0" err="1" smtClean="0"/>
+              <a:t>lil</a:t>
+            </a:r>
+            <a:r>
+              <a:rPr lang="en-US" dirty="0" smtClean="0"/>
+              <a:t> </a:t>
+            </a:r>
+            <a:r>
+              <a:rPr lang="en-US" dirty="0" err="1" smtClean="0"/>
+              <a:t>boi</a:t>
+            </a:r>
+            <a:r>
+              <a:rPr lang="en-US" dirty="0" smtClean="0"/>
+              <a:t>’)</a:t>
+            </a:r>
+          </a:p>
+          <a:p>
+            <a:pPr marL="457200" lvl="1" indent="0">
+              <a:buNone/>
+            </a:pPr>
+            <a:r>
+              <a:rPr lang="en-US" dirty="0" smtClean="0"/>
+              <a:t>    </a:t>
+            </a:r>
+            <a:r>
+              <a:rPr lang="en-US" dirty="0" err="1" smtClean="0"/>
+              <a:t>elif</a:t>
+            </a:r>
+            <a:r>
+              <a:rPr lang="en-US" dirty="0" smtClean="0"/>
+              <a:t> age &gt;= 5 and age &lt; 20</a:t>
+            </a:r>
+          </a:p>
+          <a:p>
+            <a:pPr marL="457200" lvl="1" indent="0">
+              <a:buNone/>
+            </a:pPr>
+            <a:r>
+              <a:rPr lang="en-US" dirty="0"/>
+              <a:t>	</a:t>
+            </a:r>
+            <a:r>
+              <a:rPr lang="en-US" dirty="0" smtClean="0"/>
+              <a:t>print (‘still a baby’)</a:t>
+            </a:r>
+          </a:p>
+          <a:p>
+            <a:pPr marL="457200" lvl="1" indent="0">
+              <a:buNone/>
+            </a:pPr>
+            <a:r>
+              <a:rPr lang="en-US" dirty="0" smtClean="0"/>
+              <a:t>    else:</a:t>
+            </a:r>
+          </a:p>
+          <a:p>
+            <a:pPr marL="457200" lvl="1" indent="0">
+              <a:buNone/>
+            </a:pPr>
+            <a:r>
+              <a:rPr lang="en-US" dirty="0"/>
+              <a:t>	</a:t>
+            </a:r>
+            <a:r>
+              <a:rPr lang="en-US" dirty="0" smtClean="0"/>
+              <a:t>print( ‘ </a:t>
+            </a:r>
+            <a:r>
+              <a:rPr lang="en-US" dirty="0" err="1" smtClean="0"/>
+              <a:t>lao</a:t>
+            </a:r>
+            <a:r>
+              <a:rPr lang="en-US" dirty="0" smtClean="0"/>
+              <a:t> </a:t>
+            </a:r>
+            <a:r>
+              <a:rPr lang="en-US" dirty="0" err="1" smtClean="0"/>
+              <a:t>si</a:t>
+            </a:r>
+            <a:r>
+              <a:rPr lang="en-US" dirty="0" smtClean="0"/>
+              <a:t> </a:t>
+            </a:r>
+            <a:r>
+              <a:rPr lang="en-US" dirty="0" err="1" smtClean="0"/>
+              <a:t>ji</a:t>
+            </a:r>
+            <a:r>
+              <a:rPr lang="en-US" dirty="0" smtClean="0"/>
+              <a:t>’)</a:t>
+            </a:r>
+          </a:p>
+          <a:p>
+            <a:pPr marL="457200" lvl="1" indent="0">
+              <a:buNone/>
+            </a:pPr>
+            <a:endParaRPr lang="en-US" dirty="0"/>
           </a:p>
         </p:txBody>
       </p:sp>
@@ -15858,7 +15976,7 @@
                             </p:stCondLst>
                             <p:childTnLst>
                               <p:par>
-                                <p:cTn id="20" presetID="6" presetClass="entr" presetSubtype="16" fill="hold" nodeType="clickEffect">
+                                <p:cTn id="20" presetID="14" presetClass="entr" presetSubtype="10" fill="hold" nodeType="clickEffect">
                                   <p:stCondLst>
                                     <p:cond delay="0"/>
                                   </p:stCondLst>
@@ -15885,9 +16003,9 @@
                                         <p:strVal val="visible"/>
                                       </p:to>
                                     </p:set>
-                                    <p:animEffect transition="in" filter="circle(in)">
+                                    <p:animEffect transition="in" filter="randombar(horizontal)">
                                       <p:cBhvr>
-                                        <p:cTn id="22" dur="2000"/>
+                                        <p:cTn id="22" dur="500"/>
                                         <p:tgtEl>
                                           <p:spTgt spid="3">
                                             <p:txEl>
@@ -15919,7 +16037,7 @@
                             </p:stCondLst>
                             <p:childTnLst>
                               <p:par>
-                                <p:cTn id="25" presetID="14" presetClass="entr" presetSubtype="10" fill="hold" nodeType="clickEffect">
+                                <p:cTn id="25" presetID="9" presetClass="entr" presetSubtype="0" fill="hold" nodeType="clickEffect">
                                   <p:stCondLst>
                                     <p:cond delay="0"/>
                                   </p:stCondLst>
@@ -15934,7 +16052,7 @@
                                         <p:tgtEl>
                                           <p:spTgt spid="3">
                                             <p:txEl>
-                                              <p:pRg st="3" end="3"/>
+                                              <p:pRg st="4" end="4"/>
                                             </p:txEl>
                                           </p:spTgt>
                                         </p:tgtEl>
@@ -15946,13 +16064,13 @@
                                         <p:strVal val="visible"/>
                                       </p:to>
                                     </p:set>
-                                    <p:animEffect transition="in" filter="randombar(horizontal)">
+                                    <p:animEffect transition="in" filter="dissolve">
                                       <p:cBhvr>
                                         <p:cTn id="27" dur="500"/>
                                         <p:tgtEl>
                                           <p:spTgt spid="3">
                                             <p:txEl>
-                                              <p:pRg st="3" end="3"/>
+                                              <p:pRg st="4" end="4"/>
                                             </p:txEl>
                                           </p:spTgt>
                                         </p:tgtEl>
@@ -15961,33 +16079,15 @@
                                   </p:childTnLst>
                                 </p:cTn>
                               </p:par>
-                            </p:childTnLst>
-                          </p:cTn>
-                        </p:par>
-                      </p:childTnLst>
-                    </p:cTn>
-                  </p:par>
-                  <p:par>
-                    <p:cTn id="28" fill="hold">
-                      <p:stCondLst>
-                        <p:cond delay="indefinite"/>
-                      </p:stCondLst>
-                      <p:childTnLst>
-                        <p:par>
-                          <p:cTn id="29" fill="hold">
-                            <p:stCondLst>
-                              <p:cond delay="0"/>
-                            </p:stCondLst>
-                            <p:childTnLst>
                               <p:par>
-                                <p:cTn id="30" presetID="14" presetClass="entr" presetSubtype="10" fill="hold" nodeType="clickEffect">
+                                <p:cTn id="28" presetID="9" presetClass="entr" presetSubtype="0" fill="hold" nodeType="withEffect">
                                   <p:stCondLst>
                                     <p:cond delay="0"/>
                                   </p:stCondLst>
                                   <p:childTnLst>
                                     <p:set>
                                       <p:cBhvr>
-                                        <p:cTn id="31" dur="1" fill="hold">
+                                        <p:cTn id="29" dur="1" fill="hold">
                                           <p:stCondLst>
                                             <p:cond delay="0"/>
                                           </p:stCondLst>
@@ -15995,7 +16095,7 @@
                                         <p:tgtEl>
                                           <p:spTgt spid="3">
                                             <p:txEl>
-                                              <p:pRg st="4" end="4"/>
+                                              <p:pRg st="5" end="5"/>
                                             </p:txEl>
                                           </p:spTgt>
                                         </p:tgtEl>
@@ -16007,13 +16107,13 @@
                                         <p:strVal val="visible"/>
                                       </p:to>
                                     </p:set>
-                                    <p:animEffect transition="in" filter="randombar(horizontal)">
+                                    <p:animEffect transition="in" filter="dissolve">
                                       <p:cBhvr>
-                                        <p:cTn id="32" dur="500"/>
-                                        <p:tgtEl>
-                                          <p:spTgt spid="3">
-                                            <p:txEl>
-                                              <p:pRg st="4" end="4"/>
+                                        <p:cTn id="30" dur="500"/>
+                                        <p:tgtEl>
+                                          <p:spTgt spid="3">
+                                            <p:txEl>
+                                              <p:pRg st="5" end="5"/>
                                             </p:txEl>
                                           </p:spTgt>
                                         </p:tgtEl>
@@ -16023,14 +16123,14 @@
                                 </p:cTn>
                               </p:par>
                               <p:par>
-                                <p:cTn id="33" presetID="14" presetClass="entr" presetSubtype="10" fill="hold" nodeType="withEffect">
+                                <p:cTn id="31" presetID="9" presetClass="entr" presetSubtype="0" fill="hold" nodeType="withEffect">
                                   <p:stCondLst>
                                     <p:cond delay="0"/>
                                   </p:stCondLst>
                                   <p:childTnLst>
                                     <p:set>
                                       <p:cBhvr>
-                                        <p:cTn id="34" dur="1" fill="hold">
+                                        <p:cTn id="32" dur="1" fill="hold">
                                           <p:stCondLst>
                                             <p:cond delay="0"/>
                                           </p:stCondLst>
@@ -16038,7 +16138,7 @@
                                         <p:tgtEl>
                                           <p:spTgt spid="3">
                                             <p:txEl>
-                                              <p:pRg st="5" end="5"/>
+                                              <p:pRg st="6" end="6"/>
                                             </p:txEl>
                                           </p:spTgt>
                                         </p:tgtEl>
@@ -16050,13 +16150,13 @@
                                         <p:strVal val="visible"/>
                                       </p:to>
                                     </p:set>
-                                    <p:animEffect transition="in" filter="randombar(horizontal)">
+                                    <p:animEffect transition="in" filter="dissolve">
                                       <p:cBhvr>
-                                        <p:cTn id="35" dur="500"/>
-                                        <p:tgtEl>
-                                          <p:spTgt spid="3">
-                                            <p:txEl>
-                                              <p:pRg st="5" end="5"/>
+                                        <p:cTn id="33" dur="500"/>
+                                        <p:tgtEl>
+                                          <p:spTgt spid="3">
+                                            <p:txEl>
+                                              <p:pRg st="6" end="6"/>
                                             </p:txEl>
                                           </p:spTgt>
                                         </p:tgtEl>
@@ -16066,14 +16166,14 @@
                                 </p:cTn>
                               </p:par>
                               <p:par>
-                                <p:cTn id="36" presetID="14" presetClass="entr" presetSubtype="10" fill="hold" nodeType="withEffect">
+                                <p:cTn id="34" presetID="9" presetClass="entr" presetSubtype="0" fill="hold" nodeType="withEffect">
                                   <p:stCondLst>
                                     <p:cond delay="0"/>
                                   </p:stCondLst>
                                   <p:childTnLst>
                                     <p:set>
                                       <p:cBhvr>
-                                        <p:cTn id="37" dur="1" fill="hold">
+                                        <p:cTn id="35" dur="1" fill="hold">
                                           <p:stCondLst>
                                             <p:cond delay="0"/>
                                           </p:stCondLst>
@@ -16081,7 +16181,7 @@
                                         <p:tgtEl>
                                           <p:spTgt spid="3">
                                             <p:txEl>
-                                              <p:pRg st="6" end="6"/>
+                                              <p:pRg st="7" end="7"/>
                                             </p:txEl>
                                           </p:spTgt>
                                         </p:tgtEl>
@@ -16093,13 +16193,13 @@
                                         <p:strVal val="visible"/>
                                       </p:to>
                                     </p:set>
-                                    <p:animEffect transition="in" filter="randombar(horizontal)">
+                                    <p:animEffect transition="in" filter="dissolve">
                                       <p:cBhvr>
-                                        <p:cTn id="38" dur="500"/>
-                                        <p:tgtEl>
-                                          <p:spTgt spid="3">
-                                            <p:txEl>
-                                              <p:pRg st="6" end="6"/>
+                                        <p:cTn id="36" dur="500"/>
+                                        <p:tgtEl>
+                                          <p:spTgt spid="3">
+                                            <p:txEl>
+                                              <p:pRg st="7" end="7"/>
                                             </p:txEl>
                                           </p:spTgt>
                                         </p:tgtEl>
@@ -16109,14 +16209,14 @@
                                 </p:cTn>
                               </p:par>
                               <p:par>
-                                <p:cTn id="39" presetID="14" presetClass="entr" presetSubtype="10" fill="hold" nodeType="withEffect">
+                                <p:cTn id="37" presetID="9" presetClass="entr" presetSubtype="0" fill="hold" nodeType="withEffect">
                                   <p:stCondLst>
                                     <p:cond delay="0"/>
                                   </p:stCondLst>
                                   <p:childTnLst>
                                     <p:set>
                                       <p:cBhvr>
-                                        <p:cTn id="40" dur="1" fill="hold">
+                                        <p:cTn id="38" dur="1" fill="hold">
                                           <p:stCondLst>
                                             <p:cond delay="0"/>
                                           </p:stCondLst>
@@ -16124,7 +16224,7 @@
                                         <p:tgtEl>
                                           <p:spTgt spid="3">
                                             <p:txEl>
-                                              <p:pRg st="7" end="7"/>
+                                              <p:pRg st="8" end="8"/>
                                             </p:txEl>
                                           </p:spTgt>
                                         </p:tgtEl>
@@ -16136,13 +16236,13 @@
                                         <p:strVal val="visible"/>
                                       </p:to>
                                     </p:set>
-                                    <p:animEffect transition="in" filter="randombar(horizontal)">
+                                    <p:animEffect transition="in" filter="dissolve">
                                       <p:cBhvr>
-                                        <p:cTn id="41" dur="500"/>
-                                        <p:tgtEl>
-                                          <p:spTgt spid="3">
-                                            <p:txEl>
-                                              <p:pRg st="7" end="7"/>
+                                        <p:cTn id="39" dur="500"/>
+                                        <p:tgtEl>
+                                          <p:spTgt spid="3">
+                                            <p:txEl>
+                                              <p:pRg st="8" end="8"/>
                                             </p:txEl>
                                           </p:spTgt>
                                         </p:tgtEl>
@@ -16152,14 +16252,14 @@
                                 </p:cTn>
                               </p:par>
                               <p:par>
-                                <p:cTn id="42" presetID="14" presetClass="entr" presetSubtype="10" fill="hold" nodeType="withEffect">
+                                <p:cTn id="40" presetID="9" presetClass="entr" presetSubtype="0" fill="hold" nodeType="withEffect">
                                   <p:stCondLst>
                                     <p:cond delay="0"/>
                                   </p:stCondLst>
                                   <p:childTnLst>
                                     <p:set>
                                       <p:cBhvr>
-                                        <p:cTn id="43" dur="1" fill="hold">
+                                        <p:cTn id="41" dur="1" fill="hold">
                                           <p:stCondLst>
                                             <p:cond delay="0"/>
                                           </p:stCondLst>
@@ -16167,7 +16267,7 @@
                                         <p:tgtEl>
                                           <p:spTgt spid="3">
                                             <p:txEl>
-                                              <p:pRg st="8" end="8"/>
+                                              <p:pRg st="9" end="9"/>
                                             </p:txEl>
                                           </p:spTgt>
                                         </p:tgtEl>
@@ -16179,13 +16279,13 @@
                                         <p:strVal val="visible"/>
                                       </p:to>
                                     </p:set>
-                                    <p:animEffect transition="in" filter="randombar(horizontal)">
+                                    <p:animEffect transition="in" filter="dissolve">
                                       <p:cBhvr>
-                                        <p:cTn id="44" dur="500"/>
-                                        <p:tgtEl>
-                                          <p:spTgt spid="3">
-                                            <p:txEl>
-                                              <p:pRg st="8" end="8"/>
+                                        <p:cTn id="42" dur="500"/>
+                                        <p:tgtEl>
+                                          <p:spTgt spid="3">
+                                            <p:txEl>
+                                              <p:pRg st="9" end="9"/>
                                             </p:txEl>
                                           </p:spTgt>
                                         </p:tgtEl>
@@ -16195,14 +16295,14 @@
                                 </p:cTn>
                               </p:par>
                               <p:par>
-                                <p:cTn id="45" presetID="14" presetClass="entr" presetSubtype="10" fill="hold" nodeType="withEffect">
+                                <p:cTn id="43" presetID="9" presetClass="entr" presetSubtype="0" fill="hold" nodeType="withEffect">
                                   <p:stCondLst>
                                     <p:cond delay="0"/>
                                   </p:stCondLst>
                                   <p:childTnLst>
                                     <p:set>
                                       <p:cBhvr>
-                                        <p:cTn id="46" dur="1" fill="hold">
+                                        <p:cTn id="44" dur="1" fill="hold">
                                           <p:stCondLst>
                                             <p:cond delay="0"/>
                                           </p:stCondLst>
@@ -16210,7 +16310,7 @@
                                         <p:tgtEl>
                                           <p:spTgt spid="3">
                                             <p:txEl>
-                                              <p:pRg st="9" end="9"/>
+                                              <p:pRg st="10" end="10"/>
                                             </p:txEl>
                                           </p:spTgt>
                                         </p:tgtEl>
@@ -16222,13 +16322,13 @@
                                         <p:strVal val="visible"/>
                                       </p:to>
                                     </p:set>
-                                    <p:animEffect transition="in" filter="randombar(horizontal)">
+                                    <p:animEffect transition="in" filter="dissolve">
                                       <p:cBhvr>
-                                        <p:cTn id="47" dur="500"/>
-                                        <p:tgtEl>
-                                          <p:spTgt spid="3">
-                                            <p:txEl>
-                                              <p:pRg st="9" end="9"/>
+                                        <p:cTn id="45" dur="500"/>
+                                        <p:tgtEl>
+                                          <p:spTgt spid="3">
+                                            <p:txEl>
+                                              <p:pRg st="10" end="10"/>
                                             </p:txEl>
                                           </p:spTgt>
                                         </p:tgtEl>
@@ -16238,14 +16338,14 @@
                                 </p:cTn>
                               </p:par>
                               <p:par>
-                                <p:cTn id="48" presetID="14" presetClass="entr" presetSubtype="10" fill="hold" nodeType="withEffect">
+                                <p:cTn id="46" presetID="9" presetClass="entr" presetSubtype="0" fill="hold" nodeType="withEffect">
                                   <p:stCondLst>
                                     <p:cond delay="0"/>
                                   </p:stCondLst>
                                   <p:childTnLst>
                                     <p:set>
                                       <p:cBhvr>
-                                        <p:cTn id="49" dur="1" fill="hold">
+                                        <p:cTn id="47" dur="1" fill="hold">
                                           <p:stCondLst>
                                             <p:cond delay="0"/>
                                           </p:stCondLst>
@@ -16253,7 +16353,7 @@
                                         <p:tgtEl>
                                           <p:spTgt spid="3">
                                             <p:txEl>
-                                              <p:pRg st="10" end="10"/>
+                                              <p:pRg st="11" end="11"/>
                                             </p:txEl>
                                           </p:spTgt>
                                         </p:tgtEl>
@@ -16265,13 +16365,13 @@
                                         <p:strVal val="visible"/>
                                       </p:to>
                                     </p:set>
-                                    <p:animEffect transition="in" filter="randombar(horizontal)">
+                                    <p:animEffect transition="in" filter="dissolve">
                                       <p:cBhvr>
-                                        <p:cTn id="50" dur="500"/>
-                                        <p:tgtEl>
-                                          <p:spTgt spid="3">
-                                            <p:txEl>
-                                              <p:pRg st="10" end="10"/>
+                                        <p:cTn id="48" dur="500"/>
+                                        <p:tgtEl>
+                                          <p:spTgt spid="3">
+                                            <p:txEl>
+                                              <p:pRg st="11" end="11"/>
                                             </p:txEl>
                                           </p:spTgt>
                                         </p:tgtEl>
@@ -16280,33 +16380,15 @@
                                   </p:childTnLst>
                                 </p:cTn>
                               </p:par>
-                            </p:childTnLst>
-                          </p:cTn>
-                        </p:par>
-                      </p:childTnLst>
-                    </p:cTn>
-                  </p:par>
-                  <p:par>
-                    <p:cTn id="51" fill="hold">
-                      <p:stCondLst>
-                        <p:cond delay="indefinite"/>
-                      </p:stCondLst>
-                      <p:childTnLst>
-                        <p:par>
-                          <p:cTn id="52" fill="hold">
-                            <p:stCondLst>
-                              <p:cond delay="0"/>
-                            </p:stCondLst>
-                            <p:childTnLst>
                               <p:par>
-                                <p:cTn id="53" presetID="14" presetClass="entr" presetSubtype="10" fill="hold" nodeType="clickEffect">
+                                <p:cTn id="49" presetID="9" presetClass="entr" presetSubtype="0" fill="hold" nodeType="withEffect">
                                   <p:stCondLst>
                                     <p:cond delay="0"/>
                                   </p:stCondLst>
                                   <p:childTnLst>
                                     <p:set>
                                       <p:cBhvr>
-                                        <p:cTn id="54" dur="1" fill="hold">
+                                        <p:cTn id="50" dur="1" fill="hold">
                                           <p:stCondLst>
                                             <p:cond delay="0"/>
                                           </p:stCondLst>
@@ -16314,7 +16396,7 @@
                                         <p:tgtEl>
                                           <p:spTgt spid="3">
                                             <p:txEl>
-                                              <p:pRg st="11" end="11"/>
+                                              <p:pRg st="12" end="12"/>
                                             </p:txEl>
                                           </p:spTgt>
                                         </p:tgtEl>
@@ -16326,13 +16408,13 @@
                                         <p:strVal val="visible"/>
                                       </p:to>
                                     </p:set>
-                                    <p:animEffect transition="in" filter="randombar(horizontal)">
+                                    <p:animEffect transition="in" filter="dissolve">
                                       <p:cBhvr>
-                                        <p:cTn id="55" dur="500"/>
-                                        <p:tgtEl>
-                                          <p:spTgt spid="3">
-                                            <p:txEl>
-                                              <p:pRg st="11" end="11"/>
+                                        <p:cTn id="51" dur="500"/>
+                                        <p:tgtEl>
+                                          <p:spTgt spid="3">
+                                            <p:txEl>
+                                              <p:pRg st="12" end="12"/>
                                             </p:txEl>
                                           </p:spTgt>
                                         </p:tgtEl>
@@ -16342,14 +16424,14 @@
                                 </p:cTn>
                               </p:par>
                               <p:par>
-                                <p:cTn id="56" presetID="14" presetClass="entr" presetSubtype="10" fill="hold" nodeType="withEffect">
+                                <p:cTn id="52" presetID="9" presetClass="entr" presetSubtype="0" fill="hold" nodeType="withEffect">
                                   <p:stCondLst>
                                     <p:cond delay="0"/>
                                   </p:stCondLst>
                                   <p:childTnLst>
                                     <p:set>
                                       <p:cBhvr>
-                                        <p:cTn id="57" dur="1" fill="hold">
+                                        <p:cTn id="53" dur="1" fill="hold">
                                           <p:stCondLst>
                                             <p:cond delay="0"/>
                                           </p:stCondLst>
@@ -16357,7 +16439,7 @@
                                         <p:tgtEl>
                                           <p:spTgt spid="3">
                                             <p:txEl>
-                                              <p:pRg st="12" end="12"/>
+                                              <p:pRg st="13" end="13"/>
                                             </p:txEl>
                                           </p:spTgt>
                                         </p:tgtEl>
@@ -16369,13 +16451,99 @@
                                         <p:strVal val="visible"/>
                                       </p:to>
                                     </p:set>
-                                    <p:animEffect transition="in" filter="randombar(horizontal)">
+                                    <p:animEffect transition="in" filter="dissolve">
                                       <p:cBhvr>
-                                        <p:cTn id="58" dur="500"/>
-                                        <p:tgtEl>
-                                          <p:spTgt spid="3">
-                                            <p:txEl>
-                                              <p:pRg st="12" end="12"/>
+                                        <p:cTn id="54" dur="500"/>
+                                        <p:tgtEl>
+                                          <p:spTgt spid="3">
+                                            <p:txEl>
+                                              <p:pRg st="13" end="13"/>
+                                            </p:txEl>
+                                          </p:spTgt>
+                                        </p:tgtEl>
+                                      </p:cBhvr>
+                                    </p:animEffect>
+                                  </p:childTnLst>
+                                </p:cTn>
+                              </p:par>
+                              <p:par>
+                                <p:cTn id="55" presetID="9" presetClass="entr" presetSubtype="0" fill="hold" nodeType="withEffect">
+                                  <p:stCondLst>
+                                    <p:cond delay="0"/>
+                                  </p:stCondLst>
+                                  <p:childTnLst>
+                                    <p:set>
+                                      <p:cBhvr>
+                                        <p:cTn id="56" dur="1" fill="hold">
+                                          <p:stCondLst>
+                                            <p:cond delay="0"/>
+                                          </p:stCondLst>
+                                        </p:cTn>
+                                        <p:tgtEl>
+                                          <p:spTgt spid="3">
+                                            <p:txEl>
+                                              <p:pRg st="14" end="14"/>
+                                            </p:txEl>
+                                          </p:spTgt>
+                                        </p:tgtEl>
+                                        <p:attrNameLst>
+                                          <p:attrName>style.visibility</p:attrName>
+                                        </p:attrNameLst>
+                                      </p:cBhvr>
+                                      <p:to>
+                                        <p:strVal val="visible"/>
+                                      </p:to>
+                                    </p:set>
+                                    <p:animEffect transition="in" filter="dissolve">
+                                      <p:cBhvr>
+                                        <p:cTn id="57" dur="500"/>
+                                        <p:tgtEl>
+                                          <p:spTgt spid="3">
+                                            <p:txEl>
+                                              <p:pRg st="14" end="14"/>
+                                            </p:txEl>
+                                          </p:spTgt>
+                                        </p:tgtEl>
+                                      </p:cBhvr>
+                                    </p:animEffect>
+                                  </p:childTnLst>
+                                </p:cTn>
+                              </p:par>
+                              <p:par>
+                                <p:cTn id="58" presetID="9" presetClass="entr" presetSubtype="0" fill="hold" nodeType="withEffect">
+                                  <p:stCondLst>
+                                    <p:cond delay="0"/>
+                                  </p:stCondLst>
+                                  <p:childTnLst>
+                                    <p:set>
+                                      <p:cBhvr>
+                                        <p:cTn id="59" dur="1" fill="hold">
+                                          <p:stCondLst>
+                                            <p:cond delay="0"/>
+                                          </p:stCondLst>
+                                        </p:cTn>
+                                        <p:tgtEl>
+                                          <p:spTgt spid="3">
+                                            <p:txEl>
+                                              <p:pRg st="15" end="15"/>
+                                            </p:txEl>
+                                          </p:spTgt>
+                                        </p:tgtEl>
+                                        <p:attrNameLst>
+                                          <p:attrName>style.visibility</p:attrName>
+                                        </p:attrNameLst>
+                                      </p:cBhvr>
+                                      <p:to>
+                                        <p:strVal val="visible"/>
+                                      </p:to>
+                                    </p:set>
+                                    <p:animEffect transition="in" filter="dissolve">
+                                      <p:cBhvr>
+                                        <p:cTn id="60" dur="500"/>
+                                        <p:tgtEl>
+                                          <p:spTgt spid="3">
+                                            <p:txEl>
+                                              <p:pRg st="15" end="15"/>
                                             </p:txEl>
                                           </p:spTgt>
                                         </p:tgtEl>

</xml_diff>